<commit_message>
week 8 and lab 3
</commit_message>
<xml_diff>
--- a/slides/instruction/principleWindows_3.pptx
+++ b/slides/instruction/principleWindows_3.pptx
@@ -21869,7 +21869,7 @@
           <a:p>
             <a:fld id="{62B690D2-9F6C-4A40-B045-5871089CDE7B}" type="datetimeFigureOut">
               <a:rPr lang="zh-CN" altLang="en-US" smtClean="0"/>
-              <a:t>2021/10/19</a:t>
+              <a:t>2021/10/24</a:t>
             </a:fld>
             <a:endParaRPr lang="zh-CN" altLang="en-US"/>
           </a:p>
@@ -24863,7 +24863,7 @@
           <a:p>
             <a:fld id="{F0A08C6D-CA89-457F-88D7-56281A3E4E44}" type="datetimeFigureOut">
               <a:rPr lang="zh-CN" altLang="en-US" smtClean="0"/>
-              <a:t>2021/10/19</a:t>
+              <a:t>2021/10/24</a:t>
             </a:fld>
             <a:endParaRPr lang="zh-CN" altLang="en-US"/>
           </a:p>
@@ -27588,10 +27588,10 @@
       </p:sp>
       <p:sp>
         <p:nvSpPr>
-          <p:cNvPr id="5" name="副标题 2">
+          <p:cNvPr id="6" name="副标题 2">
             <a:extLst>
               <a:ext uri="{FF2B5EF4-FFF2-40B4-BE49-F238E27FC236}">
-                <a16:creationId xmlns:a16="http://schemas.microsoft.com/office/drawing/2014/main" id="{B9E48104-BCDB-4EB2-903B-BAFA710D4F86}"/>
+                <a16:creationId xmlns:a16="http://schemas.microsoft.com/office/drawing/2014/main" id="{25DB50E5-2294-4A31-9065-95056BFD280D}"/>
               </a:ext>
             </a:extLst>
           </p:cNvPr>
@@ -27603,7 +27603,7 @@
         <p:spPr>
           <a:xfrm>
             <a:off x="114624" y="4725144"/>
-            <a:ext cx="6075783" cy="1805464"/>
+            <a:ext cx="6242633" cy="1805464"/>
           </a:xfrm>
         </p:spPr>
         <p:txBody>
@@ -27842,11 +27842,10 @@
           </a:p>
           <a:p>
             <a:pPr marL="0" indent="0" algn="r">
-              <a:buFont typeface="Arial" panose="020B0604020202020204" pitchFamily="34" charset="0"/>
               <a:buNone/>
             </a:pPr>
             <a:r>
-              <a:rPr lang="en-US" altLang="zh-CN" sz="2400" dirty="0">
+              <a:rPr lang="en-US" altLang="zh-CN" sz="2000" dirty="0">
                 <a:solidFill>
                   <a:schemeClr val="accent1">
                     <a:lumMod val="75000"/>
@@ -27855,7 +27854,7 @@
                 <a:latin typeface="Arial" panose="020B0604020202020204" pitchFamily="34" charset="0"/>
                 <a:cs typeface="Arial" panose="020B0604020202020204" pitchFamily="34" charset="0"/>
               </a:rPr>
-              <a:t>https://gitee.com/wuhanuniversity/</a:t>
+              <a:t>https://gitee.com/principlewindows/win-principle-2021</a:t>
             </a:r>
           </a:p>
         </p:txBody>

</xml_diff>